<commit_message>
Adapter + some State
</commit_message>
<xml_diff>
--- a/PPT/Back to the basics, explaining design patterns with real life examples - Adapter & State.pptx
+++ b/PPT/Back to the basics, explaining design patterns with real life examples - Adapter & State.pptx
@@ -141,7 +141,7 @@
 <file path=ppt/revisionInfo.xml><?xml version="1.0" encoding="utf-8"?>
 <p1510:revInfo xmlns:a="http://schemas.openxmlformats.org/drawingml/2006/main" xmlns:r="http://schemas.openxmlformats.org/officeDocument/2006/relationships" xmlns:p1510="http://schemas.microsoft.com/office/powerpoint/2015/10/main">
   <p1510:revLst>
-    <p1510:client id="{0A25F207-8A80-46FA-9C6D-4F6D8CAC765E}" v="13" dt="2025-08-24T09:22:40.060"/>
+    <p1510:client id="{0A25F207-8A80-46FA-9C6D-4F6D8CAC765E}" v="35" dt="2025-08-26T12:39:34.945"/>
   </p1510:revLst>
 </p1510:revInfo>
 </file>
@@ -151,7 +151,7 @@
   <pc:docChgLst>
     <pc:chgData name="Daniel Laurentiu Schmidt" userId="9ab8f5a0-558d-473f-8210-f04e6f74bedf" providerId="ADAL" clId="{0A25F207-8A80-46FA-9C6D-4F6D8CAC765E}"/>
     <pc:docChg chg="undo custSel modSld">
-      <pc:chgData name="Daniel Laurentiu Schmidt" userId="9ab8f5a0-558d-473f-8210-f04e6f74bedf" providerId="ADAL" clId="{0A25F207-8A80-46FA-9C6D-4F6D8CAC765E}" dt="2025-08-24T09:44:07.678" v="2164" actId="20577"/>
+      <pc:chgData name="Daniel Laurentiu Schmidt" userId="9ab8f5a0-558d-473f-8210-f04e6f74bedf" providerId="ADAL" clId="{0A25F207-8A80-46FA-9C6D-4F6D8CAC765E}" dt="2025-08-26T13:28:40.019" v="3633" actId="478"/>
       <pc:docMkLst>
         <pc:docMk/>
       </pc:docMkLst>
@@ -184,14 +184,6 @@
             <ac:picMk id="2" creationId="{49142A8B-F015-D0D1-6046-1E24AF2609B4}"/>
           </ac:picMkLst>
         </pc:picChg>
-        <pc:picChg chg="del">
-          <ac:chgData name="Daniel Laurentiu Schmidt" userId="9ab8f5a0-558d-473f-8210-f04e6f74bedf" providerId="ADAL" clId="{0A25F207-8A80-46FA-9C6D-4F6D8CAC765E}" dt="2025-08-23T11:19:01.170" v="23" actId="478"/>
-          <ac:picMkLst>
-            <pc:docMk/>
-            <pc:sldMk cId="3445509486" sldId="270"/>
-            <ac:picMk id="9" creationId="{48C4FCCF-A736-C84D-3C4F-CADA346E22FF}"/>
-          </ac:picMkLst>
-        </pc:picChg>
         <pc:picChg chg="mod">
           <ac:chgData name="Daniel Laurentiu Schmidt" userId="9ab8f5a0-558d-473f-8210-f04e6f74bedf" providerId="ADAL" clId="{0A25F207-8A80-46FA-9C6D-4F6D8CAC765E}" dt="2025-08-23T11:18:54.536" v="21" actId="1076"/>
           <ac:picMkLst>
@@ -207,28 +199,12 @@
           <pc:docMk/>
           <pc:sldMk cId="2710007919" sldId="271"/>
         </pc:sldMkLst>
-        <pc:picChg chg="del">
-          <ac:chgData name="Daniel Laurentiu Schmidt" userId="9ab8f5a0-558d-473f-8210-f04e6f74bedf" providerId="ADAL" clId="{0A25F207-8A80-46FA-9C6D-4F6D8CAC765E}" dt="2025-08-23T11:18:32.972" v="14" actId="478"/>
-          <ac:picMkLst>
-            <pc:docMk/>
-            <pc:sldMk cId="2710007919" sldId="271"/>
-            <ac:picMk id="2" creationId="{A6396533-CC07-BAFB-3AFE-1580A4E1B219}"/>
-          </ac:picMkLst>
-        </pc:picChg>
         <pc:picChg chg="add mod">
           <ac:chgData name="Daniel Laurentiu Schmidt" userId="9ab8f5a0-558d-473f-8210-f04e6f74bedf" providerId="ADAL" clId="{0A25F207-8A80-46FA-9C6D-4F6D8CAC765E}" dt="2025-08-23T11:18:38.660" v="15" actId="1076"/>
           <ac:picMkLst>
             <pc:docMk/>
             <pc:sldMk cId="2710007919" sldId="271"/>
             <ac:picMk id="5" creationId="{CC6B8544-4D50-00C6-0B99-1BDB8C0C3C10}"/>
-          </ac:picMkLst>
-        </pc:picChg>
-        <pc:picChg chg="add del mod">
-          <ac:chgData name="Daniel Laurentiu Schmidt" userId="9ab8f5a0-558d-473f-8210-f04e6f74bedf" providerId="ADAL" clId="{0A25F207-8A80-46FA-9C6D-4F6D8CAC765E}" dt="2025-08-23T11:20:00.077" v="25" actId="478"/>
-          <ac:picMkLst>
-            <pc:docMk/>
-            <pc:sldMk cId="2710007919" sldId="271"/>
-            <ac:picMk id="7" creationId="{DF4A1679-6A28-FA22-ECB1-288CF5DA0863}"/>
           </ac:picMkLst>
         </pc:picChg>
         <pc:picChg chg="add mod">
@@ -355,28 +331,12 @@
             <ac:spMk id="6" creationId="{EA9FF163-2E35-9F16-6224-D4C5E670A89F}"/>
           </ac:spMkLst>
         </pc:spChg>
-        <pc:picChg chg="add del mod">
-          <ac:chgData name="Daniel Laurentiu Schmidt" userId="9ab8f5a0-558d-473f-8210-f04e6f74bedf" providerId="ADAL" clId="{0A25F207-8A80-46FA-9C6D-4F6D8CAC765E}" dt="2025-08-24T09:40:34.481" v="2143" actId="478"/>
-          <ac:picMkLst>
-            <pc:docMk/>
-            <pc:sldMk cId="3640432184" sldId="275"/>
-            <ac:picMk id="5" creationId="{F21B33CF-7C99-4A51-CDB4-0B1293A80702}"/>
-          </ac:picMkLst>
-        </pc:picChg>
         <pc:picChg chg="add mod">
           <ac:chgData name="Daniel Laurentiu Schmidt" userId="9ab8f5a0-558d-473f-8210-f04e6f74bedf" providerId="ADAL" clId="{0A25F207-8A80-46FA-9C6D-4F6D8CAC765E}" dt="2025-08-24T09:40:47.664" v="2147" actId="1076"/>
           <ac:picMkLst>
             <pc:docMk/>
             <pc:sldMk cId="3640432184" sldId="275"/>
             <ac:picMk id="8" creationId="{60BD5E3D-C2FA-3C3A-3867-B1A6F2813B60}"/>
-          </ac:picMkLst>
-        </pc:picChg>
-        <pc:picChg chg="del mod">
-          <ac:chgData name="Daniel Laurentiu Schmidt" userId="9ab8f5a0-558d-473f-8210-f04e6f74bedf" providerId="ADAL" clId="{0A25F207-8A80-46FA-9C6D-4F6D8CAC765E}" dt="2025-08-24T09:22:06.642" v="1461" actId="478"/>
-          <ac:picMkLst>
-            <pc:docMk/>
-            <pc:sldMk cId="3640432184" sldId="275"/>
-            <ac:picMk id="10" creationId="{287354BD-7291-E8E8-7CC7-8E1DB2133063}"/>
           </ac:picMkLst>
         </pc:picChg>
       </pc:sldChg>
@@ -402,14 +362,6 @@
             <ac:spMk id="6" creationId="{E09151F1-770D-04B3-4CE8-069D1F678563}"/>
           </ac:spMkLst>
         </pc:spChg>
-        <pc:picChg chg="del">
-          <ac:chgData name="Daniel Laurentiu Schmidt" userId="9ab8f5a0-558d-473f-8210-f04e6f74bedf" providerId="ADAL" clId="{0A25F207-8A80-46FA-9C6D-4F6D8CAC765E}" dt="2025-08-24T09:30:49.881" v="2122" actId="478"/>
-          <ac:picMkLst>
-            <pc:docMk/>
-            <pc:sldMk cId="461529983" sldId="276"/>
-            <ac:picMk id="2" creationId="{E40E035D-5ABF-97C3-30B8-966E10D43B79}"/>
-          </ac:picMkLst>
-        </pc:picChg>
         <pc:picChg chg="add mod">
           <ac:chgData name="Daniel Laurentiu Schmidt" userId="9ab8f5a0-558d-473f-8210-f04e6f74bedf" providerId="ADAL" clId="{0A25F207-8A80-46FA-9C6D-4F6D8CAC765E}" dt="2025-08-24T09:43:56.558" v="2157" actId="1076"/>
           <ac:picMkLst>
@@ -420,11 +372,50 @@
         </pc:picChg>
       </pc:sldChg>
       <pc:sldChg chg="modSp mod">
-        <pc:chgData name="Daniel Laurentiu Schmidt" userId="9ab8f5a0-558d-473f-8210-f04e6f74bedf" providerId="ADAL" clId="{0A25F207-8A80-46FA-9C6D-4F6D8CAC765E}" dt="2025-08-24T09:44:07.678" v="2164" actId="20577"/>
+        <pc:chgData name="Daniel Laurentiu Schmidt" userId="9ab8f5a0-558d-473f-8210-f04e6f74bedf" providerId="ADAL" clId="{0A25F207-8A80-46FA-9C6D-4F6D8CAC765E}" dt="2025-08-26T12:48:05.701" v="2882" actId="20577"/>
+        <pc:sldMkLst>
+          <pc:docMk/>
+          <pc:sldMk cId="3184352506" sldId="277"/>
+        </pc:sldMkLst>
+        <pc:spChg chg="mod">
+          <ac:chgData name="Daniel Laurentiu Schmidt" userId="9ab8f5a0-558d-473f-8210-f04e6f74bedf" providerId="ADAL" clId="{0A25F207-8A80-46FA-9C6D-4F6D8CAC765E}" dt="2025-08-26T12:39:40.112" v="2352" actId="20577"/>
+          <ac:spMkLst>
+            <pc:docMk/>
+            <pc:sldMk cId="3184352506" sldId="277"/>
+            <ac:spMk id="2" creationId="{D42E4777-6320-484D-35B8-4FC90A20ACE2}"/>
+          </ac:spMkLst>
+        </pc:spChg>
+        <pc:spChg chg="mod">
+          <ac:chgData name="Daniel Laurentiu Schmidt" userId="9ab8f5a0-558d-473f-8210-f04e6f74bedf" providerId="ADAL" clId="{0A25F207-8A80-46FA-9C6D-4F6D8CAC765E}" dt="2025-08-26T12:04:42.680" v="2189" actId="20577"/>
+          <ac:spMkLst>
+            <pc:docMk/>
+            <pc:sldMk cId="3184352506" sldId="277"/>
+            <ac:spMk id="6" creationId="{2F5EFE83-2DD6-A206-ED36-C0484C6E088D}"/>
+          </ac:spMkLst>
+        </pc:spChg>
+        <pc:spChg chg="mod">
+          <ac:chgData name="Daniel Laurentiu Schmidt" userId="9ab8f5a0-558d-473f-8210-f04e6f74bedf" providerId="ADAL" clId="{0A25F207-8A80-46FA-9C6D-4F6D8CAC765E}" dt="2025-08-26T12:48:05.701" v="2882" actId="20577"/>
+          <ac:spMkLst>
+            <pc:docMk/>
+            <pc:sldMk cId="3184352506" sldId="277"/>
+            <ac:spMk id="7" creationId="{8113B97D-B264-A6C4-ABA6-F079C3841A2C}"/>
+          </ac:spMkLst>
+        </pc:spChg>
+      </pc:sldChg>
+      <pc:sldChg chg="modSp mod">
+        <pc:chgData name="Daniel Laurentiu Schmidt" userId="9ab8f5a0-558d-473f-8210-f04e6f74bedf" providerId="ADAL" clId="{0A25F207-8A80-46FA-9C6D-4F6D8CAC765E}" dt="2025-08-26T11:52:13.499" v="2184" actId="20577"/>
         <pc:sldMkLst>
           <pc:docMk/>
           <pc:sldMk cId="3803058074" sldId="281"/>
         </pc:sldMkLst>
+        <pc:spChg chg="mod">
+          <ac:chgData name="Daniel Laurentiu Schmidt" userId="9ab8f5a0-558d-473f-8210-f04e6f74bedf" providerId="ADAL" clId="{0A25F207-8A80-46FA-9C6D-4F6D8CAC765E}" dt="2025-08-26T11:52:13.499" v="2184" actId="20577"/>
+          <ac:spMkLst>
+            <pc:docMk/>
+            <pc:sldMk cId="3803058074" sldId="281"/>
+            <ac:spMk id="4" creationId="{21793812-83EB-98F9-C1AA-5DDDF9E51F50}"/>
+          </ac:spMkLst>
+        </pc:spChg>
         <pc:spChg chg="mod">
           <ac:chgData name="Daniel Laurentiu Schmidt" userId="9ab8f5a0-558d-473f-8210-f04e6f74bedf" providerId="ADAL" clId="{0A25F207-8A80-46FA-9C6D-4F6D8CAC765E}" dt="2025-08-24T09:44:07.678" v="2164" actId="20577"/>
           <ac:spMkLst>
@@ -433,6 +424,52 @@
             <ac:spMk id="6" creationId="{4AED4F56-7195-E0D7-D522-4BB262165ED5}"/>
           </ac:spMkLst>
         </pc:spChg>
+      </pc:sldChg>
+      <pc:sldChg chg="modSp mod">
+        <pc:chgData name="Daniel Laurentiu Schmidt" userId="9ab8f5a0-558d-473f-8210-f04e6f74bedf" providerId="ADAL" clId="{0A25F207-8A80-46FA-9C6D-4F6D8CAC765E}" dt="2025-08-26T13:28:10.246" v="3632" actId="20577"/>
+        <pc:sldMkLst>
+          <pc:docMk/>
+          <pc:sldMk cId="1510368498" sldId="283"/>
+        </pc:sldMkLst>
+        <pc:spChg chg="mod">
+          <ac:chgData name="Daniel Laurentiu Schmidt" userId="9ab8f5a0-558d-473f-8210-f04e6f74bedf" providerId="ADAL" clId="{0A25F207-8A80-46FA-9C6D-4F6D8CAC765E}" dt="2025-08-26T13:28:10.246" v="3632" actId="20577"/>
+          <ac:spMkLst>
+            <pc:docMk/>
+            <pc:sldMk cId="1510368498" sldId="283"/>
+            <ac:spMk id="2" creationId="{66FDA351-0C36-CE1B-05BB-EE80B892548C}"/>
+          </ac:spMkLst>
+        </pc:spChg>
+        <pc:spChg chg="mod">
+          <ac:chgData name="Daniel Laurentiu Schmidt" userId="9ab8f5a0-558d-473f-8210-f04e6f74bedf" providerId="ADAL" clId="{0A25F207-8A80-46FA-9C6D-4F6D8CAC765E}" dt="2025-08-26T13:25:57.221" v="3363" actId="20577"/>
+          <ac:spMkLst>
+            <pc:docMk/>
+            <pc:sldMk cId="1510368498" sldId="283"/>
+            <ac:spMk id="6" creationId="{B29F58BD-E68B-8200-F803-1BF6500FFDE7}"/>
+          </ac:spMkLst>
+        </pc:spChg>
+      </pc:sldChg>
+      <pc:sldChg chg="delSp modSp mod">
+        <pc:chgData name="Daniel Laurentiu Schmidt" userId="9ab8f5a0-558d-473f-8210-f04e6f74bedf" providerId="ADAL" clId="{0A25F207-8A80-46FA-9C6D-4F6D8CAC765E}" dt="2025-08-26T13:28:40.019" v="3633" actId="478"/>
+        <pc:sldMkLst>
+          <pc:docMk/>
+          <pc:sldMk cId="4086353399" sldId="284"/>
+        </pc:sldMkLst>
+        <pc:spChg chg="mod">
+          <ac:chgData name="Daniel Laurentiu Schmidt" userId="9ab8f5a0-558d-473f-8210-f04e6f74bedf" providerId="ADAL" clId="{0A25F207-8A80-46FA-9C6D-4F6D8CAC765E}" dt="2025-08-26T13:25:53.719" v="3358" actId="20577"/>
+          <ac:spMkLst>
+            <pc:docMk/>
+            <pc:sldMk cId="4086353399" sldId="284"/>
+            <ac:spMk id="6" creationId="{9A73F275-46C1-0232-23CD-0594E20FA1B6}"/>
+          </ac:spMkLst>
+        </pc:spChg>
+        <pc:picChg chg="del">
+          <ac:chgData name="Daniel Laurentiu Schmidt" userId="9ab8f5a0-558d-473f-8210-f04e6f74bedf" providerId="ADAL" clId="{0A25F207-8A80-46FA-9C6D-4F6D8CAC765E}" dt="2025-08-26T13:28:40.019" v="3633" actId="478"/>
+          <ac:picMkLst>
+            <pc:docMk/>
+            <pc:sldMk cId="4086353399" sldId="284"/>
+            <ac:picMk id="5" creationId="{25FAD399-C65F-C235-7B42-860886FC2112}"/>
+          </ac:picMkLst>
+        </pc:picChg>
       </pc:sldChg>
       <pc:sldChg chg="modSp mod">
         <pc:chgData name="Daniel Laurentiu Schmidt" userId="9ab8f5a0-558d-473f-8210-f04e6f74bedf" providerId="ADAL" clId="{0A25F207-8A80-46FA-9C6D-4F6D8CAC765E}" dt="2025-08-23T11:11:39.898" v="12" actId="20577"/>
@@ -15850,7 +15887,7 @@
                 <a:sym typeface="Poppins Regular"/>
                 <a:hlinkClick r:id="rId3"/>
               </a:rPr>
-              <a:t>https://github.com/Iamsdl/Endava-DesignPatterns/tree/main/Bridge</a:t>
+              <a:t>https://github.com/Iamsdl/Endava-DesignPatterns/tree/main/Adapter</a:t>
             </a:r>
             <a:endParaRPr kumimoji="0" lang="en-US" sz="4000" b="0" i="0" u="none" strike="noStrike" cap="none" spc="0" normalizeH="0" baseline="0" dirty="0">
               <a:ln>
@@ -15934,7 +15971,7 @@
           <a:p>
             <a:r>
               <a:rPr lang="en-US" dirty="0"/>
-              <a:t>Prototype</a:t>
+              <a:t>State</a:t>
             </a:r>
           </a:p>
         </p:txBody>
@@ -16019,7 +16056,7 @@
         </p:nvSpPr>
         <p:spPr>
           <a:xfrm>
-            <a:off x="1006004" y="4406246"/>
+            <a:off x="1006004" y="4406245"/>
             <a:ext cx="22371992" cy="1476815"/>
           </a:xfrm>
           <a:prstGeom prst="rect">
@@ -16051,21 +16088,13 @@
           </a:bodyPr>
           <a:lstStyle/>
           <a:p>
-            <a:pPr marL="0" marR="0" indent="0" algn="l" defTabSz="821531" rtl="0" fontAlgn="auto" latinLnBrk="0" hangingPunct="0">
+            <a:pPr defTabSz="821531" hangingPunct="0">
               <a:lnSpc>
                 <a:spcPct val="120000"/>
               </a:lnSpc>
               <a:spcBef>
                 <a:spcPts val="1500"/>
               </a:spcBef>
-              <a:spcAft>
-                <a:spcPts val="0"/>
-              </a:spcAft>
-              <a:buClrTx/>
-              <a:buSzTx/>
-              <a:buFontTx/>
-              <a:buNone/>
-              <a:tabLst/>
             </a:pPr>
             <a:r>
               <a:rPr kumimoji="0" lang="en-US" sz="3200" b="0" i="0" u="none" strike="noStrike" cap="none" spc="0" normalizeH="0" baseline="0" dirty="0">
@@ -16082,8 +16111,46 @@
                 <a:cs typeface="+mn-cs"/>
                 <a:sym typeface="Poppins Regular"/>
               </a:rPr>
-              <a:t>Prototype is a creational design pattern that lets you copy existing objects without making your code dependent on their classes.</a:t>
-            </a:r>
+              <a:t>State is a behavioral design pattern that lets an object alter its behavior when its internal state changes. </a:t>
+            </a:r>
+            <a:r>
+              <a:rPr lang="en-US" sz="3200" dirty="0">
+                <a:solidFill>
+                  <a:schemeClr val="bg2"/>
+                </a:solidFill>
+                <a:sym typeface="Poppins Regular"/>
+              </a:rPr>
+              <a:t>It’s the proper way to model a </a:t>
+            </a:r>
+            <a:r>
+              <a:rPr lang="en-US" sz="3200" dirty="0">
+                <a:hlinkClick r:id="rId3"/>
+              </a:rPr>
+              <a:t>Finite-state machine - Wikipedia</a:t>
+            </a:r>
+            <a:r>
+              <a:rPr lang="en-US" sz="3200" dirty="0">
+                <a:solidFill>
+                  <a:schemeClr val="bg2"/>
+                </a:solidFill>
+                <a:sym typeface="Poppins Regular"/>
+              </a:rPr>
+              <a:t> in code.</a:t>
+            </a:r>
+            <a:endParaRPr kumimoji="0" lang="en-US" sz="3200" b="0" i="0" u="none" strike="noStrike" cap="none" spc="0" normalizeH="0" baseline="0" dirty="0">
+              <a:ln>
+                <a:noFill/>
+              </a:ln>
+              <a:solidFill>
+                <a:schemeClr val="bg2"/>
+              </a:solidFill>
+              <a:effectLst/>
+              <a:uFillTx/>
+              <a:latin typeface="+mn-lt"/>
+              <a:ea typeface="+mn-ea"/>
+              <a:cs typeface="+mn-cs"/>
+              <a:sym typeface="Poppins Regular"/>
+            </a:endParaRPr>
           </a:p>
         </p:txBody>
       </p:sp>
@@ -16167,8 +16234,8 @@
         </p:nvSpPr>
         <p:spPr>
           <a:xfrm>
-            <a:off x="1006004" y="7832940"/>
-            <a:ext cx="22371992" cy="2260106"/>
+            <a:off x="1006004" y="7441295"/>
+            <a:ext cx="22371992" cy="3043397"/>
           </a:xfrm>
           <a:prstGeom prst="rect">
             <a:avLst/>
@@ -16228,7 +16295,7 @@
                 <a:cs typeface="+mn-cs"/>
                 <a:sym typeface="Poppins Regular"/>
               </a:rPr>
-              <a:t>Encapsulation</a:t>
+              <a:t>Single Responsibility and Encapsulation</a:t>
             </a:r>
             <a:r>
               <a:rPr kumimoji="0" lang="en-US" sz="3200" i="0" strike="noStrike" cap="none" spc="0" normalizeH="0" baseline="0" dirty="0">
@@ -16245,8 +16312,56 @@
                 <a:cs typeface="+mn-cs"/>
                 <a:sym typeface="Poppins Regular"/>
               </a:rPr>
-              <a:t> - The Prototype pattern encapsulates the knowledge of which concrete class to instantiate.</a:t>
-            </a:r>
+              <a:t> – Behaviors are contained in State classes. The only reason for a state class to change is if the state machine changes.</a:t>
+            </a:r>
+          </a:p>
+          <a:p>
+            <a:pPr marR="0" algn="l" defTabSz="821531" rtl="0" fontAlgn="auto" latinLnBrk="0" hangingPunct="0">
+              <a:lnSpc>
+                <a:spcPct val="120000"/>
+              </a:lnSpc>
+              <a:spcBef>
+                <a:spcPts val="1500"/>
+              </a:spcBef>
+              <a:spcAft>
+                <a:spcPts val="0"/>
+              </a:spcAft>
+              <a:buClrTx/>
+              <a:buSzTx/>
+              <a:tabLst/>
+            </a:pPr>
+            <a:r>
+              <a:rPr lang="en-US" sz="3200" u="sng" dirty="0">
+                <a:solidFill>
+                  <a:schemeClr val="bg2"/>
+                </a:solidFill>
+                <a:sym typeface="Poppins Regular"/>
+              </a:rPr>
+              <a:t>Open-Closed Principle</a:t>
+            </a:r>
+            <a:r>
+              <a:rPr lang="en-US" sz="3200" dirty="0">
+                <a:solidFill>
+                  <a:schemeClr val="bg2"/>
+                </a:solidFill>
+                <a:sym typeface="Poppins Regular"/>
+              </a:rPr>
+              <a:t> – New states can be added to the machine with minimal effort.</a:t>
+            </a:r>
+            <a:endParaRPr kumimoji="0" lang="en-US" sz="3200" i="0" strike="noStrike" cap="none" spc="0" normalizeH="0" baseline="0" dirty="0">
+              <a:ln>
+                <a:noFill/>
+              </a:ln>
+              <a:solidFill>
+                <a:schemeClr val="bg2"/>
+              </a:solidFill>
+              <a:effectLst/>
+              <a:uFillTx/>
+              <a:latin typeface="+mn-lt"/>
+              <a:ea typeface="+mn-ea"/>
+              <a:cs typeface="+mn-cs"/>
+              <a:sym typeface="Poppins Regular"/>
+            </a:endParaRPr>
           </a:p>
           <a:p>
             <a:pPr marR="0" algn="l" defTabSz="821531" rtl="0" fontAlgn="auto" latinLnBrk="0" hangingPunct="0">
@@ -16312,8 +16427,40 @@
                 <a:cs typeface="+mn-cs"/>
                 <a:sym typeface="Poppins Regular"/>
               </a:rPr>
-              <a:t> - Since clones are returned via a common interface (e.g., Prototype), they can be used interchangeably with the originals.</a:t>
-            </a:r>
+              <a:t> – The whole pattern revolves around it. </a:t>
+            </a:r>
+            <a:r>
+              <a:rPr lang="en-US" sz="3200" dirty="0">
+                <a:solidFill>
+                  <a:schemeClr val="bg2"/>
+                </a:solidFill>
+                <a:sym typeface="Poppins Regular"/>
+              </a:rPr>
+              <a:t>States are interchangeable</a:t>
+            </a:r>
+            <a:r>
+              <a:rPr kumimoji="0" lang="en-US" sz="3200" i="0" strike="noStrike" cap="none" spc="0" normalizeH="0" baseline="0" dirty="0">
+                <a:ln>
+                  <a:noFill/>
+                </a:ln>
+                <a:solidFill>
+                  <a:schemeClr val="bg2"/>
+                </a:solidFill>
+                <a:effectLst/>
+                <a:uFillTx/>
+                <a:latin typeface="+mn-lt"/>
+                <a:ea typeface="+mn-ea"/>
+                <a:cs typeface="+mn-cs"/>
+                <a:sym typeface="Poppins Regular"/>
+              </a:rPr>
+              <a:t>.</a:t>
+            </a:r>
+            <a:endParaRPr lang="en-US" sz="3200" dirty="0">
+              <a:solidFill>
+                <a:schemeClr val="bg2"/>
+              </a:solidFill>
+              <a:sym typeface="Poppins Regular"/>
+            </a:endParaRPr>
           </a:p>
         </p:txBody>
       </p:sp>
@@ -16382,7 +16529,7 @@
           <a:p>
             <a:r>
               <a:rPr lang="en-US" dirty="0"/>
-              <a:t>Prototype</a:t>
+              <a:t>State</a:t>
             </a:r>
           </a:p>
         </p:txBody>
@@ -16467,8 +16614,8 @@
         </p:nvSpPr>
         <p:spPr>
           <a:xfrm>
-            <a:off x="1006004" y="4257547"/>
-            <a:ext cx="22371992" cy="5200911"/>
+            <a:off x="1006004" y="4553014"/>
+            <a:ext cx="22371992" cy="4609980"/>
           </a:xfrm>
           <a:prstGeom prst="rect">
             <a:avLst/>
@@ -16516,109 +16663,85 @@
               <a:tabLst/>
             </a:pPr>
             <a:r>
-              <a:rPr kumimoji="0" lang="en-US" sz="3200" b="0" i="0" u="none" strike="noStrike" cap="none" spc="0" normalizeH="0" baseline="0" dirty="0">
-                <a:ln>
-                  <a:noFill/>
-                </a:ln>
+              <a:rPr lang="en-US" sz="3200" dirty="0">
                 <a:solidFill>
                   <a:schemeClr val="bg2"/>
                 </a:solidFill>
-                <a:effectLst/>
-                <a:uFillTx/>
-                <a:latin typeface="+mn-lt"/>
-                <a:ea typeface="+mn-ea"/>
-                <a:cs typeface="+mn-cs"/>
                 <a:sym typeface="Poppins Regular"/>
               </a:rPr>
-              <a:t>A medical booth for remote consultations equipped with medical devices for performing various </a:t>
-            </a:r>
-          </a:p>
-          <a:p>
-            <a:pPr marL="0" marR="0" indent="0" algn="l" defTabSz="821531" rtl="0" fontAlgn="auto" latinLnBrk="0" hangingPunct="0">
+              <a:t>A “Blender” style </a:t>
+            </a:r>
+            <a:r>
+              <a:rPr lang="en-US" sz="3200" b="1" dirty="0">
+                <a:solidFill>
+                  <a:schemeClr val="bg2"/>
+                </a:solidFill>
+                <a:sym typeface="Poppins Regular"/>
+              </a:rPr>
+              <a:t>VR</a:t>
+            </a:r>
+            <a:r>
+              <a:rPr lang="en-US" sz="3200" dirty="0">
+                <a:solidFill>
+                  <a:schemeClr val="bg2"/>
+                </a:solidFill>
+                <a:sym typeface="Poppins Regular"/>
+              </a:rPr>
+              <a:t> 3D modelling application featuring:</a:t>
+            </a:r>
+          </a:p>
+          <a:p>
+            <a:pPr marL="914400" lvl="1" indent="-457200" defTabSz="821531" hangingPunct="0">
               <a:lnSpc>
                 <a:spcPct val="120000"/>
               </a:lnSpc>
               <a:spcBef>
                 <a:spcPts val="1500"/>
               </a:spcBef>
-              <a:spcAft>
-                <a:spcPts val="0"/>
-              </a:spcAft>
-              <a:buClrTx/>
-              <a:buSzTx/>
-              <a:buFontTx/>
-              <a:buNone/>
-              <a:tabLst/>
+              <a:buFont typeface="Arial" panose="020B0604020202020204" pitchFamily="34" charset="0"/>
+              <a:buChar char="•"/>
             </a:pPr>
             <a:r>
-              <a:rPr kumimoji="0" lang="en-US" sz="3200" b="0" i="0" u="none" strike="noStrike" cap="none" spc="0" normalizeH="0" baseline="0" dirty="0">
-                <a:ln>
-                  <a:noFill/>
-                </a:ln>
+              <a:rPr lang="en-US" sz="3200" dirty="0">
                 <a:solidFill>
                   <a:schemeClr val="bg2"/>
                 </a:solidFill>
-                <a:effectLst/>
-                <a:uFillTx/>
-                <a:latin typeface="+mn-lt"/>
-                <a:ea typeface="+mn-ea"/>
-                <a:cs typeface="+mn-cs"/>
                 <a:sym typeface="Poppins Regular"/>
               </a:rPr>
-              <a:t>measurements (blood pressure, oximetry, weight).</a:t>
-            </a:r>
-          </a:p>
-          <a:p>
-            <a:pPr marL="457200" marR="0" indent="-457200" algn="l" defTabSz="821531" rtl="0" fontAlgn="auto" latinLnBrk="0" hangingPunct="0">
+              <a:t>An “Object Mode”, allowing the user to manipulate (move, rotate, scale) of objects in the scene</a:t>
+            </a:r>
+          </a:p>
+          <a:p>
+            <a:pPr marL="914400" lvl="1" indent="-457200" defTabSz="821531" hangingPunct="0">
               <a:lnSpc>
                 <a:spcPct val="120000"/>
               </a:lnSpc>
               <a:spcBef>
                 <a:spcPts val="1500"/>
               </a:spcBef>
-              <a:spcAft>
-                <a:spcPts val="0"/>
-              </a:spcAft>
-              <a:buClrTx/>
-              <a:buSzTx/>
               <a:buFont typeface="Arial" panose="020B0604020202020204" pitchFamily="34" charset="0"/>
               <a:buChar char="•"/>
-              <a:tabLst/>
             </a:pPr>
             <a:r>
-              <a:rPr kumimoji="0" lang="en-US" sz="3200" b="0" i="0" u="none" strike="noStrike" cap="none" spc="0" normalizeH="0" baseline="0" dirty="0">
-                <a:ln>
-                  <a:noFill/>
-                </a:ln>
+              <a:rPr lang="en-US" sz="3200" dirty="0">
                 <a:solidFill>
                   <a:schemeClr val="bg2"/>
                 </a:solidFill>
-                <a:effectLst/>
-                <a:uFillTx/>
-                <a:latin typeface="+mn-lt"/>
-                <a:ea typeface="+mn-ea"/>
-                <a:cs typeface="+mn-cs"/>
                 <a:sym typeface="Poppins Regular"/>
               </a:rPr>
-              <a:t>The patient is making an appointment at a specific time, for a cabin and a doctor.</a:t>
-            </a:r>
-          </a:p>
-          <a:p>
-            <a:pPr marL="457200" marR="0" indent="-457200" algn="l" defTabSz="821531" rtl="0" fontAlgn="auto" latinLnBrk="0" hangingPunct="0">
+              <a:t>An “Edit Mode” allowing the user to edit (add vertices, faces, extrude) a single object</a:t>
+            </a:r>
+          </a:p>
+          <a:p>
+            <a:pPr marL="914400" lvl="1" indent="-457200" defTabSz="821531" hangingPunct="0">
               <a:lnSpc>
                 <a:spcPct val="120000"/>
               </a:lnSpc>
               <a:spcBef>
                 <a:spcPts val="1500"/>
               </a:spcBef>
-              <a:spcAft>
-                <a:spcPts val="0"/>
-              </a:spcAft>
-              <a:buClrTx/>
-              <a:buSzTx/>
               <a:buFont typeface="Arial" panose="020B0604020202020204" pitchFamily="34" charset="0"/>
               <a:buChar char="•"/>
-              <a:tabLst/>
             </a:pPr>
             <a:r>
               <a:rPr lang="en-US" sz="3200" dirty="0">
@@ -16627,22 +16750,8 @@
                 </a:solidFill>
                 <a:sym typeface="Poppins Regular"/>
               </a:rPr>
-              <a:t>An admin application displays these appointments in a calendar.</a:t>
-            </a:r>
-            <a:endParaRPr kumimoji="0" lang="en-US" sz="3200" b="0" i="0" u="none" strike="noStrike" cap="none" spc="0" normalizeH="0" baseline="0" dirty="0">
-              <a:ln>
-                <a:noFill/>
-              </a:ln>
-              <a:solidFill>
-                <a:schemeClr val="bg2"/>
-              </a:solidFill>
-              <a:effectLst/>
-              <a:uFillTx/>
-              <a:latin typeface="+mn-lt"/>
-              <a:ea typeface="+mn-ea"/>
-              <a:cs typeface="+mn-cs"/>
-              <a:sym typeface="Poppins Regular"/>
-            </a:endParaRPr>
+              <a:t>A “Particle mode” allowing the user to play around with particles</a:t>
+            </a:r>
           </a:p>
           <a:p>
             <a:pPr marL="457200" indent="-457200" defTabSz="821531" hangingPunct="0">
@@ -16656,48 +16765,13 @@
               <a:buChar char="•"/>
             </a:pPr>
             <a:r>
-              <a:rPr kumimoji="0" lang="en-US" sz="3200" b="0" i="0" u="none" strike="noStrike" cap="none" spc="0" normalizeH="0" baseline="0" dirty="0">
-                <a:ln>
-                  <a:noFill/>
-                </a:ln>
-                <a:solidFill>
-                  <a:schemeClr val="bg2"/>
-                </a:solidFill>
-                <a:effectLst/>
-                <a:uFillTx/>
-                <a:latin typeface="+mn-lt"/>
-                <a:ea typeface="+mn-ea"/>
-                <a:cs typeface="+mn-cs"/>
-                <a:sym typeface="Poppins Regular"/>
-              </a:rPr>
-              <a:t>The problem: </a:t>
-            </a:r>
-            <a:r>
               <a:rPr lang="en-US" sz="3200" dirty="0">
                 <a:solidFill>
                   <a:schemeClr val="bg2"/>
                 </a:solidFill>
                 <a:sym typeface="Poppins Regular"/>
               </a:rPr>
-              <a:t>The same appointment needed to be shown twice, once for the cabin and once for the doctor. The cabin and doctor serving that appointment could be in different time zones. The backend needed to duplicate the appointment in order to set the correct </a:t>
-            </a:r>
-            <a:r>
-              <a:rPr lang="en-US" sz="3200" dirty="0" err="1">
-                <a:solidFill>
-                  <a:schemeClr val="bg2"/>
-                </a:solidFill>
-                <a:sym typeface="Poppins Regular"/>
-              </a:rPr>
-              <a:t>timezone</a:t>
-            </a:r>
-            <a:r>
-              <a:rPr lang="en-US" sz="3200" dirty="0">
-                <a:solidFill>
-                  <a:schemeClr val="bg2"/>
-                </a:solidFill>
-                <a:sym typeface="Poppins Regular"/>
-              </a:rPr>
-              <a:t> information for each instance.</a:t>
+              <a:t>Being in VR, the application had to use a small number of gestures to implement a larger number of functionalities.</a:t>
             </a:r>
           </a:p>
         </p:txBody>
@@ -16767,7 +16841,7 @@
           <a:p>
             <a:r>
               <a:rPr lang="en-US" dirty="0"/>
-              <a:t>Prototype</a:t>
+              <a:t>State</a:t>
             </a:r>
           </a:p>
         </p:txBody>
@@ -16838,42 +16912,6 @@
           </a:p>
         </p:txBody>
       </p:sp>
-      <p:pic>
-        <p:nvPicPr>
-          <p:cNvPr id="5" name="Picture 4" descr="A schedule of appointment time&#10;&#10;AI-generated content may be incorrect.">
-            <a:extLst>
-              <a:ext uri="{FF2B5EF4-FFF2-40B4-BE49-F238E27FC236}">
-                <a16:creationId xmlns:a16="http://schemas.microsoft.com/office/drawing/2014/main" id="{25FAD399-C65F-C235-7B42-860886FC2112}"/>
-              </a:ext>
-            </a:extLst>
-          </p:cNvPr>
-          <p:cNvPicPr>
-            <a:picLocks noChangeAspect="1"/>
-          </p:cNvPicPr>
-          <p:nvPr/>
-        </p:nvPicPr>
-        <p:blipFill>
-          <a:blip r:embed="rId3">
-            <a:extLst>
-              <a:ext uri="{28A0092B-C50C-407E-A947-70E740481C1C}">
-                <a14:useLocalDpi xmlns:a14="http://schemas.microsoft.com/office/drawing/2010/main" val="0"/>
-              </a:ext>
-            </a:extLst>
-          </a:blip>
-          <a:stretch>
-            <a:fillRect/>
-          </a:stretch>
-        </p:blipFill>
-        <p:spPr>
-          <a:xfrm>
-            <a:off x="5648070" y="4110781"/>
-            <a:ext cx="11836100" cy="8683982"/>
-          </a:xfrm>
-          <a:prstGeom prst="rect">
-            <a:avLst/>
-          </a:prstGeom>
-        </p:spPr>
-      </p:pic>
     </p:spTree>
     <p:extLst>
       <p:ext uri="{BB962C8B-B14F-4D97-AF65-F5344CB8AC3E}">

</xml_diff>